<commit_message>
test 1 for Berlin Signed-off-by: Diettrich <Jan.Diettrich@dlr.de>
</commit_message>
<xml_diff>
--- a/NoteBooks/Bilder/ProcessFlowOverview.pptx
+++ b/NoteBooks/Bilder/ProcessFlowOverview.pptx
@@ -7,7 +7,7 @@
   <p:sldIdLst>
     <p:sldId id="256" r:id="rId2"/>
   </p:sldIdLst>
-  <p:sldSz cx="6858000" cy="9144000" type="screen4x3"/>
+  <p:sldSz cx="6499225" cy="7704138"/>
   <p:notesSz cx="6858000" cy="9144000"/>
   <p:defaultTextStyle>
     <a:defPPr>
@@ -136,8 +136,8 @@
         </p:nvSpPr>
         <p:spPr>
           <a:xfrm>
-            <a:off x="514350" y="2840568"/>
-            <a:ext cx="5829300" cy="1960033"/>
+            <a:off x="487442" y="2393278"/>
+            <a:ext cx="5524341" cy="1651396"/>
           </a:xfrm>
         </p:spPr>
         <p:txBody>
@@ -164,8 +164,8 @@
         </p:nvSpPr>
         <p:spPr>
           <a:xfrm>
-            <a:off x="1028700" y="5181600"/>
-            <a:ext cx="4800600" cy="2336800"/>
+            <a:off x="974884" y="4365679"/>
+            <a:ext cx="4549458" cy="1968835"/>
           </a:xfrm>
         </p:spPr>
         <p:txBody>
@@ -288,7 +288,7 @@
           <a:p>
             <a:fld id="{1BA50D42-C9CD-4801-B293-61D1F53EC57E}" type="datetimeFigureOut">
               <a:rPr lang="de-DE" smtClean="0"/>
-              <a:t>12.12.2019</a:t>
+              <a:t>07.01.2020</a:t>
             </a:fld>
             <a:endParaRPr lang="de-DE"/>
           </a:p>
@@ -453,7 +453,7 @@
           <a:p>
             <a:fld id="{1BA50D42-C9CD-4801-B293-61D1F53EC57E}" type="datetimeFigureOut">
               <a:rPr lang="de-DE" smtClean="0"/>
-              <a:t>12.12.2019</a:t>
+              <a:t>07.01.2020</a:t>
             </a:fld>
             <a:endParaRPr lang="de-DE"/>
           </a:p>
@@ -538,8 +538,8 @@
         </p:nvSpPr>
         <p:spPr>
           <a:xfrm>
-            <a:off x="4972050" y="366185"/>
-            <a:ext cx="1543050" cy="7802033"/>
+            <a:off x="4711938" y="308524"/>
+            <a:ext cx="1462326" cy="6573484"/>
           </a:xfrm>
         </p:spPr>
         <p:txBody>
@@ -566,8 +566,8 @@
         </p:nvSpPr>
         <p:spPr>
           <a:xfrm>
-            <a:off x="342900" y="366185"/>
-            <a:ext cx="4514850" cy="7802033"/>
+            <a:off x="324961" y="308524"/>
+            <a:ext cx="4278656" cy="6573484"/>
           </a:xfrm>
         </p:spPr>
         <p:txBody>
@@ -628,7 +628,7 @@
           <a:p>
             <a:fld id="{1BA50D42-C9CD-4801-B293-61D1F53EC57E}" type="datetimeFigureOut">
               <a:rPr lang="de-DE" smtClean="0"/>
-              <a:t>12.12.2019</a:t>
+              <a:t>07.01.2020</a:t>
             </a:fld>
             <a:endParaRPr lang="de-DE"/>
           </a:p>
@@ -793,7 +793,7 @@
           <a:p>
             <a:fld id="{1BA50D42-C9CD-4801-B293-61D1F53EC57E}" type="datetimeFigureOut">
               <a:rPr lang="de-DE" smtClean="0"/>
-              <a:t>12.12.2019</a:t>
+              <a:t>07.01.2020</a:t>
             </a:fld>
             <a:endParaRPr lang="de-DE"/>
           </a:p>
@@ -878,8 +878,8 @@
         </p:nvSpPr>
         <p:spPr>
           <a:xfrm>
-            <a:off x="541735" y="5875867"/>
-            <a:ext cx="5829300" cy="1816100"/>
+            <a:off x="513394" y="4950624"/>
+            <a:ext cx="5524341" cy="1530127"/>
           </a:xfrm>
         </p:spPr>
         <p:txBody>
@@ -910,8 +910,8 @@
         </p:nvSpPr>
         <p:spPr>
           <a:xfrm>
-            <a:off x="541735" y="3875618"/>
-            <a:ext cx="5829300" cy="2000249"/>
+            <a:off x="513394" y="3265344"/>
+            <a:ext cx="5524341" cy="1685279"/>
           </a:xfrm>
         </p:spPr>
         <p:txBody>
@@ -1034,7 +1034,7 @@
           <a:p>
             <a:fld id="{1BA50D42-C9CD-4801-B293-61D1F53EC57E}" type="datetimeFigureOut">
               <a:rPr lang="de-DE" smtClean="0"/>
-              <a:t>12.12.2019</a:t>
+              <a:t>07.01.2020</a:t>
             </a:fld>
             <a:endParaRPr lang="de-DE"/>
           </a:p>
@@ -1142,8 +1142,8 @@
         </p:nvSpPr>
         <p:spPr>
           <a:xfrm>
-            <a:off x="342900" y="2133601"/>
-            <a:ext cx="3028950" cy="6034617"/>
+            <a:off x="324961" y="1797635"/>
+            <a:ext cx="2870491" cy="5084375"/>
           </a:xfrm>
         </p:spPr>
         <p:txBody>
@@ -1227,8 +1227,8 @@
         </p:nvSpPr>
         <p:spPr>
           <a:xfrm>
-            <a:off x="3486150" y="2133601"/>
-            <a:ext cx="3028950" cy="6034617"/>
+            <a:off x="3303773" y="1797635"/>
+            <a:ext cx="2870491" cy="5084375"/>
           </a:xfrm>
         </p:spPr>
         <p:txBody>
@@ -1317,7 +1317,7 @@
           <a:p>
             <a:fld id="{1BA50D42-C9CD-4801-B293-61D1F53EC57E}" type="datetimeFigureOut">
               <a:rPr lang="de-DE" smtClean="0"/>
-              <a:t>12.12.2019</a:t>
+              <a:t>07.01.2020</a:t>
             </a:fld>
             <a:endParaRPr lang="de-DE"/>
           </a:p>
@@ -1429,8 +1429,8 @@
         </p:nvSpPr>
         <p:spPr>
           <a:xfrm>
-            <a:off x="342900" y="2046817"/>
-            <a:ext cx="3030141" cy="853016"/>
+            <a:off x="324962" y="1724515"/>
+            <a:ext cx="2871620" cy="718696"/>
           </a:xfrm>
         </p:spPr>
         <p:txBody>
@@ -1494,8 +1494,8 @@
         </p:nvSpPr>
         <p:spPr>
           <a:xfrm>
-            <a:off x="342900" y="2899833"/>
-            <a:ext cx="3030141" cy="5268384"/>
+            <a:off x="324962" y="2443211"/>
+            <a:ext cx="2871620" cy="4438797"/>
           </a:xfrm>
         </p:spPr>
         <p:txBody>
@@ -1579,8 +1579,8 @@
         </p:nvSpPr>
         <p:spPr>
           <a:xfrm>
-            <a:off x="3483769" y="2046817"/>
-            <a:ext cx="3031331" cy="853016"/>
+            <a:off x="3301519" y="1724515"/>
+            <a:ext cx="2872747" cy="718696"/>
           </a:xfrm>
         </p:spPr>
         <p:txBody>
@@ -1644,8 +1644,8 @@
         </p:nvSpPr>
         <p:spPr>
           <a:xfrm>
-            <a:off x="3483769" y="2899833"/>
-            <a:ext cx="3031331" cy="5268384"/>
+            <a:off x="3301519" y="2443211"/>
+            <a:ext cx="2872747" cy="4438797"/>
           </a:xfrm>
         </p:spPr>
         <p:txBody>
@@ -1734,7 +1734,7 @@
           <a:p>
             <a:fld id="{1BA50D42-C9CD-4801-B293-61D1F53EC57E}" type="datetimeFigureOut">
               <a:rPr lang="de-DE" smtClean="0"/>
-              <a:t>12.12.2019</a:t>
+              <a:t>07.01.2020</a:t>
             </a:fld>
             <a:endParaRPr lang="de-DE"/>
           </a:p>
@@ -1847,7 +1847,7 @@
           <a:p>
             <a:fld id="{1BA50D42-C9CD-4801-B293-61D1F53EC57E}" type="datetimeFigureOut">
               <a:rPr lang="de-DE" smtClean="0"/>
-              <a:t>12.12.2019</a:t>
+              <a:t>07.01.2020</a:t>
             </a:fld>
             <a:endParaRPr lang="de-DE"/>
           </a:p>
@@ -1937,7 +1937,7 @@
           <a:p>
             <a:fld id="{1BA50D42-C9CD-4801-B293-61D1F53EC57E}" type="datetimeFigureOut">
               <a:rPr lang="de-DE" smtClean="0"/>
-              <a:t>12.12.2019</a:t>
+              <a:t>07.01.2020</a:t>
             </a:fld>
             <a:endParaRPr lang="de-DE"/>
           </a:p>
@@ -2022,8 +2022,8 @@
         </p:nvSpPr>
         <p:spPr>
           <a:xfrm>
-            <a:off x="342900" y="364067"/>
-            <a:ext cx="2256235" cy="1549400"/>
+            <a:off x="324964" y="306740"/>
+            <a:ext cx="2138200" cy="1305424"/>
           </a:xfrm>
         </p:spPr>
         <p:txBody>
@@ -2054,8 +2054,8 @@
         </p:nvSpPr>
         <p:spPr>
           <a:xfrm>
-            <a:off x="2681287" y="364067"/>
-            <a:ext cx="3833813" cy="7804151"/>
+            <a:off x="2541018" y="306740"/>
+            <a:ext cx="3633248" cy="6575269"/>
           </a:xfrm>
         </p:spPr>
         <p:txBody>
@@ -2139,8 +2139,8 @@
         </p:nvSpPr>
         <p:spPr>
           <a:xfrm>
-            <a:off x="342900" y="1913467"/>
-            <a:ext cx="2256235" cy="6254751"/>
+            <a:off x="324964" y="1612165"/>
+            <a:ext cx="2138200" cy="5269845"/>
           </a:xfrm>
         </p:spPr>
         <p:txBody>
@@ -2209,7 +2209,7 @@
           <a:p>
             <a:fld id="{1BA50D42-C9CD-4801-B293-61D1F53EC57E}" type="datetimeFigureOut">
               <a:rPr lang="de-DE" smtClean="0"/>
-              <a:t>12.12.2019</a:t>
+              <a:t>07.01.2020</a:t>
             </a:fld>
             <a:endParaRPr lang="de-DE"/>
           </a:p>
@@ -2294,8 +2294,8 @@
         </p:nvSpPr>
         <p:spPr>
           <a:xfrm>
-            <a:off x="1344216" y="6400800"/>
-            <a:ext cx="4114800" cy="755651"/>
+            <a:off x="1273894" y="5392898"/>
+            <a:ext cx="3899535" cy="636662"/>
           </a:xfrm>
         </p:spPr>
         <p:txBody>
@@ -2326,8 +2326,8 @@
         </p:nvSpPr>
         <p:spPr>
           <a:xfrm>
-            <a:off x="1344216" y="817033"/>
-            <a:ext cx="4114800" cy="5486400"/>
+            <a:off x="1273894" y="688380"/>
+            <a:ext cx="3899535" cy="4622483"/>
           </a:xfrm>
         </p:spPr>
         <p:txBody>
@@ -2387,8 +2387,8 @@
         </p:nvSpPr>
         <p:spPr>
           <a:xfrm>
-            <a:off x="1344216" y="7156451"/>
-            <a:ext cx="4114800" cy="1073149"/>
+            <a:off x="1273894" y="6029559"/>
+            <a:ext cx="3899535" cy="904166"/>
           </a:xfrm>
         </p:spPr>
         <p:txBody>
@@ -2457,7 +2457,7 @@
           <a:p>
             <a:fld id="{1BA50D42-C9CD-4801-B293-61D1F53EC57E}" type="datetimeFigureOut">
               <a:rPr lang="de-DE" smtClean="0"/>
-              <a:t>12.12.2019</a:t>
+              <a:t>07.01.2020</a:t>
             </a:fld>
             <a:endParaRPr lang="de-DE"/>
           </a:p>
@@ -2547,8 +2547,8 @@
         </p:nvSpPr>
         <p:spPr>
           <a:xfrm>
-            <a:off x="342900" y="366184"/>
-            <a:ext cx="6172200" cy="1524000"/>
+            <a:off x="324961" y="308524"/>
+            <a:ext cx="5849303" cy="1284023"/>
           </a:xfrm>
           <a:prstGeom prst="rect">
             <a:avLst/>
@@ -2580,8 +2580,8 @@
         </p:nvSpPr>
         <p:spPr>
           <a:xfrm>
-            <a:off x="342900" y="2133601"/>
-            <a:ext cx="6172200" cy="6034617"/>
+            <a:off x="324961" y="1797635"/>
+            <a:ext cx="5849303" cy="5084375"/>
           </a:xfrm>
           <a:prstGeom prst="rect">
             <a:avLst/>
@@ -2642,8 +2642,8 @@
         </p:nvSpPr>
         <p:spPr>
           <a:xfrm>
-            <a:off x="342900" y="8475134"/>
-            <a:ext cx="1600200" cy="486833"/>
+            <a:off x="324961" y="7140596"/>
+            <a:ext cx="1516486" cy="410174"/>
           </a:xfrm>
           <a:prstGeom prst="rect">
             <a:avLst/>
@@ -2665,7 +2665,7 @@
           <a:p>
             <a:fld id="{1BA50D42-C9CD-4801-B293-61D1F53EC57E}" type="datetimeFigureOut">
               <a:rPr lang="de-DE" smtClean="0"/>
-              <a:t>12.12.2019</a:t>
+              <a:t>07.01.2020</a:t>
             </a:fld>
             <a:endParaRPr lang="de-DE"/>
           </a:p>
@@ -2683,8 +2683,8 @@
         </p:nvSpPr>
         <p:spPr>
           <a:xfrm>
-            <a:off x="2343150" y="8475134"/>
-            <a:ext cx="2171700" cy="486833"/>
+            <a:off x="2220569" y="7140596"/>
+            <a:ext cx="2058088" cy="410174"/>
           </a:xfrm>
           <a:prstGeom prst="rect">
             <a:avLst/>
@@ -2720,8 +2720,8 @@
         </p:nvSpPr>
         <p:spPr>
           <a:xfrm>
-            <a:off x="4914900" y="8475134"/>
-            <a:ext cx="1600200" cy="486833"/>
+            <a:off x="4657778" y="7140596"/>
+            <a:ext cx="1516486" cy="410174"/>
           </a:xfrm>
           <a:prstGeom prst="rect">
             <a:avLst/>
@@ -3037,13 +3037,13 @@
       </p:grpSpPr>
       <p:sp>
         <p:nvSpPr>
-          <p:cNvPr id="4" name="Textfeld 3"/>
+          <p:cNvPr id="37" name="Textfeld 36"/>
           <p:cNvSpPr txBox="1"/>
           <p:nvPr/>
         </p:nvSpPr>
         <p:spPr>
           <a:xfrm>
-            <a:off x="548680" y="395536"/>
+            <a:off x="260648" y="179661"/>
             <a:ext cx="4010521" cy="369332"/>
           </a:xfrm>
           <a:prstGeom prst="rect">
@@ -3072,13 +3072,13 @@
       </p:sp>
       <p:sp>
         <p:nvSpPr>
-          <p:cNvPr id="5" name="Textfeld 4"/>
+          <p:cNvPr id="38" name="Textfeld 37"/>
           <p:cNvSpPr txBox="1"/>
           <p:nvPr/>
         </p:nvSpPr>
         <p:spPr>
           <a:xfrm>
-            <a:off x="548680" y="1178332"/>
+            <a:off x="260648" y="962457"/>
             <a:ext cx="2962606" cy="369332"/>
           </a:xfrm>
           <a:prstGeom prst="rect">
@@ -3106,13 +3106,13 @@
       </p:sp>
       <p:sp>
         <p:nvSpPr>
-          <p:cNvPr id="6" name="Textfeld 5"/>
+          <p:cNvPr id="39" name="Textfeld 38"/>
           <p:cNvSpPr txBox="1"/>
           <p:nvPr/>
         </p:nvSpPr>
         <p:spPr>
           <a:xfrm>
-            <a:off x="1484784" y="2546484"/>
+            <a:off x="1196752" y="2330609"/>
             <a:ext cx="961995" cy="369332"/>
           </a:xfrm>
           <a:prstGeom prst="rect">
@@ -3135,19 +3135,18 @@
               <a:rPr lang="en-US" dirty="0" smtClean="0"/>
               <a:t>Data QA</a:t>
             </a:r>
-            <a:endParaRPr lang="en-US" dirty="0" smtClean="0"/>
-          </a:p>
-        </p:txBody>
-      </p:sp>
-      <p:sp>
-        <p:nvSpPr>
-          <p:cNvPr id="7" name="Textfeld 6"/>
+          </a:p>
+        </p:txBody>
+      </p:sp>
+      <p:sp>
+        <p:nvSpPr>
+          <p:cNvPr id="40" name="Textfeld 39"/>
           <p:cNvSpPr txBox="1"/>
           <p:nvPr/>
         </p:nvSpPr>
         <p:spPr>
           <a:xfrm>
-            <a:off x="548680" y="1970420"/>
+            <a:off x="260648" y="1754545"/>
             <a:ext cx="3009093" cy="369332"/>
           </a:xfrm>
           <a:prstGeom prst="rect">
@@ -3176,13 +3175,13 @@
       </p:sp>
       <p:sp>
         <p:nvSpPr>
-          <p:cNvPr id="8" name="Textfeld 7"/>
+          <p:cNvPr id="41" name="Textfeld 40"/>
           <p:cNvSpPr txBox="1"/>
           <p:nvPr/>
         </p:nvSpPr>
         <p:spPr>
           <a:xfrm>
-            <a:off x="503955" y="5057472"/>
+            <a:off x="215923" y="4841597"/>
             <a:ext cx="2049985" cy="369332"/>
           </a:xfrm>
           <a:prstGeom prst="rect">
@@ -3211,13 +3210,13 @@
       </p:sp>
       <p:sp>
         <p:nvSpPr>
-          <p:cNvPr id="9" name="Textfeld 8"/>
+          <p:cNvPr id="42" name="Textfeld 41"/>
           <p:cNvSpPr txBox="1"/>
           <p:nvPr/>
         </p:nvSpPr>
         <p:spPr>
           <a:xfrm>
-            <a:off x="1484784" y="5633536"/>
+            <a:off x="1196752" y="5417661"/>
             <a:ext cx="5043047" cy="369332"/>
           </a:xfrm>
           <a:prstGeom prst="rect">
@@ -3246,13 +3245,13 @@
       </p:sp>
       <p:sp>
         <p:nvSpPr>
-          <p:cNvPr id="10" name="Textfeld 9"/>
+          <p:cNvPr id="43" name="Textfeld 42"/>
           <p:cNvSpPr txBox="1"/>
           <p:nvPr/>
         </p:nvSpPr>
         <p:spPr>
           <a:xfrm>
-            <a:off x="1484784" y="6220633"/>
+            <a:off x="1196752" y="6004758"/>
             <a:ext cx="4893006" cy="646331"/>
           </a:xfrm>
           <a:prstGeom prst="rect">
@@ -3288,13 +3287,13 @@
       </p:sp>
       <p:sp>
         <p:nvSpPr>
-          <p:cNvPr id="11" name="Textfeld 10"/>
+          <p:cNvPr id="44" name="Textfeld 43"/>
           <p:cNvSpPr txBox="1"/>
           <p:nvPr/>
         </p:nvSpPr>
         <p:spPr>
           <a:xfrm>
-            <a:off x="1484784" y="3122548"/>
+            <a:off x="1196752" y="2906673"/>
             <a:ext cx="3402278" cy="369332"/>
           </a:xfrm>
           <a:prstGeom prst="rect">
@@ -3317,19 +3316,18 @@
               <a:rPr lang="en-US" dirty="0" smtClean="0"/>
               <a:t>Testing possible heuristic methods</a:t>
             </a:r>
-            <a:endParaRPr lang="en-US" dirty="0" smtClean="0"/>
-          </a:p>
-        </p:txBody>
-      </p:sp>
-      <p:sp>
-        <p:nvSpPr>
-          <p:cNvPr id="12" name="Textfeld 11"/>
+          </a:p>
+        </p:txBody>
+      </p:sp>
+      <p:sp>
+        <p:nvSpPr>
+          <p:cNvPr id="45" name="Textfeld 44"/>
           <p:cNvSpPr txBox="1"/>
           <p:nvPr/>
         </p:nvSpPr>
         <p:spPr>
           <a:xfrm>
-            <a:off x="1484784" y="3698612"/>
+            <a:off x="1196752" y="3482737"/>
             <a:ext cx="2776145" cy="369332"/>
           </a:xfrm>
           <a:prstGeom prst="rect">
@@ -3352,19 +3350,18 @@
               <a:rPr lang="en-US" dirty="0" smtClean="0"/>
               <a:t>Selecting heuristic methods</a:t>
             </a:r>
-            <a:endParaRPr lang="en-US" dirty="0" smtClean="0"/>
-          </a:p>
-        </p:txBody>
-      </p:sp>
-      <p:sp>
-        <p:nvSpPr>
-          <p:cNvPr id="15" name="Textfeld 14"/>
+          </a:p>
+        </p:txBody>
+      </p:sp>
+      <p:sp>
+        <p:nvSpPr>
+          <p:cNvPr id="46" name="Textfeld 45"/>
           <p:cNvSpPr txBox="1"/>
           <p:nvPr/>
         </p:nvSpPr>
         <p:spPr>
           <a:xfrm>
-            <a:off x="1484784" y="4265384"/>
+            <a:off x="1196752" y="4049509"/>
             <a:ext cx="3778983" cy="369332"/>
           </a:xfrm>
           <a:prstGeom prst="rect">
@@ -3392,13 +3389,13 @@
       </p:sp>
       <p:sp>
         <p:nvSpPr>
-          <p:cNvPr id="16" name="Textfeld 15"/>
+          <p:cNvPr id="47" name="Textfeld 46"/>
           <p:cNvSpPr txBox="1"/>
           <p:nvPr/>
         </p:nvSpPr>
         <p:spPr>
           <a:xfrm>
-            <a:off x="476672" y="7371020"/>
+            <a:off x="188640" y="7155145"/>
             <a:ext cx="2489912" cy="369332"/>
           </a:xfrm>
           <a:prstGeom prst="rect">

</xml_diff>